<commit_message>
0105 fix the bugs and edit ppt file
</commit_message>
<xml_diff>
--- a/ppt/JSproject.pptx
+++ b/ppt/JSproject.pptx
@@ -658,7 +658,7 @@
           <a:effectLst/>
           <a:extLst>
             <a:ext uri="{91240B29-F687-4f45-9708-019B960494DF}">
-              <a14:hiddenLine xmlns:a14="http://schemas.microsoft.com/office/drawing/2010/main" xmlns="" w="9525">
+              <a14:hiddenLine xmlns="" xmlns:a14="http://schemas.microsoft.com/office/drawing/2010/main" w="9525">
                 <a:solidFill>
                   <a:srgbClr val="000000"/>
                 </a:solidFill>
@@ -2180,7 +2180,7 @@
           <a:ln/>
           <a:extLst>
             <a:ext uri="{91240B29-F687-4f45-9708-019B960494DF}">
-              <a14:hiddenLine xmlns:a14="http://schemas.microsoft.com/office/drawing/2010/main" xmlns="" w="9525">
+              <a14:hiddenLine xmlns="" xmlns:a14="http://schemas.microsoft.com/office/drawing/2010/main" w="9525">
                 <a:solidFill>
                   <a:srgbClr val="000000"/>
                 </a:solidFill>
@@ -2455,7 +2455,7 @@
           <a:ln/>
           <a:extLst>
             <a:ext uri="{91240B29-F687-4f45-9708-019B960494DF}">
-              <a14:hiddenLine xmlns:a14="http://schemas.microsoft.com/office/drawing/2010/main" xmlns="" w="9525">
+              <a14:hiddenLine xmlns="" xmlns:a14="http://schemas.microsoft.com/office/drawing/2010/main" w="9525">
                 <a:solidFill>
                   <a:srgbClr val="000000"/>
                 </a:solidFill>
@@ -2738,7 +2738,7 @@
           <a:ln/>
           <a:extLst>
             <a:ext uri="{91240B29-F687-4f45-9708-019B960494DF}">
-              <a14:hiddenLine xmlns:a14="http://schemas.microsoft.com/office/drawing/2010/main" xmlns="" w="9525">
+              <a14:hiddenLine xmlns="" xmlns:a14="http://schemas.microsoft.com/office/drawing/2010/main" w="9525">
                 <a:solidFill>
                   <a:srgbClr val="000000"/>
                 </a:solidFill>
@@ -3364,7 +3364,7 @@
           <a:ln/>
           <a:extLst>
             <a:ext uri="{91240B29-F687-4f45-9708-019B960494DF}">
-              <a14:hiddenLine xmlns:a14="http://schemas.microsoft.com/office/drawing/2010/main" xmlns="" w="9525">
+              <a14:hiddenLine xmlns="" xmlns:a14="http://schemas.microsoft.com/office/drawing/2010/main" w="9525">
                 <a:solidFill>
                   <a:srgbClr val="000000"/>
                 </a:solidFill>
@@ -3703,7 +3703,7 @@
           <a:ln/>
           <a:extLst>
             <a:ext uri="{91240B29-F687-4f45-9708-019B960494DF}">
-              <a14:hiddenLine xmlns:a14="http://schemas.microsoft.com/office/drawing/2010/main" xmlns="" w="9525">
+              <a14:hiddenLine xmlns="" xmlns:a14="http://schemas.microsoft.com/office/drawing/2010/main" w="9525">
                 <a:solidFill>
                   <a:srgbClr val="000000"/>
                 </a:solidFill>
@@ -4180,7 +4180,7 @@
           <a:ln/>
           <a:extLst>
             <a:ext uri="{91240B29-F687-4f45-9708-019B960494DF}">
-              <a14:hiddenLine xmlns:a14="http://schemas.microsoft.com/office/drawing/2010/main" xmlns="" w="9525">
+              <a14:hiddenLine xmlns="" xmlns:a14="http://schemas.microsoft.com/office/drawing/2010/main" w="9525">
                 <a:solidFill>
                   <a:srgbClr val="000000"/>
                 </a:solidFill>
@@ -4609,7 +4609,7 @@
           <a:ln/>
           <a:extLst>
             <a:ext uri="{91240B29-F687-4f45-9708-019B960494DF}">
-              <a14:hiddenLine xmlns:a14="http://schemas.microsoft.com/office/drawing/2010/main" xmlns="" w="9525">
+              <a14:hiddenLine xmlns="" xmlns:a14="http://schemas.microsoft.com/office/drawing/2010/main" w="9525">
                 <a:solidFill>
                   <a:srgbClr val="000000"/>
                 </a:solidFill>
@@ -11857,7 +11857,14 @@
           <a:lstStyle/>
           <a:p>
             <a:r>
-              <a:rPr lang="zh-TW" altLang="en-US" sz="4000" b="1" dirty="0">
+              <a:rPr lang="en-US" altLang="zh-TW" sz="4000" b="1" smtClean="0">
+                <a:latin typeface="微軟正黑體" panose="020B0604030504040204" pitchFamily="34" charset="-120"/>
+                <a:ea typeface="微軟正黑體" panose="020B0604030504040204" pitchFamily="34" charset="-120"/>
+              </a:rPr>
+              <a:t>0105</a:t>
+            </a:r>
+            <a:r>
+              <a:rPr lang="zh-TW" altLang="en-US" sz="4000" b="1" smtClean="0">
                 <a:latin typeface="微軟正黑體" panose="020B0604030504040204" pitchFamily="34" charset="-120"/>
                 <a:ea typeface="微軟正黑體" panose="020B0604030504040204" pitchFamily="34" charset="-120"/>
               </a:rPr>

</xml_diff>

<commit_message>
Revert "0105 fix the bugs and edit ppt file"
This reverts commit 9b0f3dca8f53127eb916f2ede6cb45c8fd74a469.
</commit_message>
<xml_diff>
--- a/ppt/JSproject.pptx
+++ b/ppt/JSproject.pptx
@@ -211,7 +211,7 @@
           <a:p>
             <a:fld id="{83FD5102-83BC-4CD5-9A8B-B0BE4C37E468}" type="datetimeFigureOut">
               <a:rPr lang="zh-TW" altLang="en-US" smtClean="0"/>
-              <a:t>2016/1/6</a:t>
+              <a:t>2016/1/5</a:t>
             </a:fld>
             <a:endParaRPr lang="zh-TW" altLang="en-US"/>
           </a:p>
@@ -658,7 +658,7 @@
           <a:effectLst/>
           <a:extLst>
             <a:ext uri="{91240B29-F687-4f45-9708-019B960494DF}">
-              <a14:hiddenLine xmlns:a14="http://schemas.microsoft.com/office/drawing/2010/main" xmlns="" w="9525">
+              <a14:hiddenLine xmlns="" xmlns:a14="http://schemas.microsoft.com/office/drawing/2010/main" w="9525">
                 <a:solidFill>
                   <a:srgbClr val="000000"/>
                 </a:solidFill>
@@ -850,7 +850,7 @@
           <a:p>
             <a:fld id="{EE4BB34A-3E76-440A-BB03-4C2839922E1C}" type="datetimeFigureOut">
               <a:rPr lang="zh-TW" altLang="en-US" smtClean="0"/>
-              <a:t>2016/1/6</a:t>
+              <a:t>2016/1/5</a:t>
             </a:fld>
             <a:endParaRPr lang="zh-TW" altLang="en-US"/>
           </a:p>
@@ -1168,7 +1168,7 @@
           <a:p>
             <a:fld id="{EE4BB34A-3E76-440A-BB03-4C2839922E1C}" type="datetimeFigureOut">
               <a:rPr lang="zh-TW" altLang="en-US" smtClean="0"/>
-              <a:t>2016/1/6</a:t>
+              <a:t>2016/1/5</a:t>
             </a:fld>
             <a:endParaRPr lang="zh-TW" altLang="en-US"/>
           </a:p>
@@ -1656,7 +1656,7 @@
           <a:p>
             <a:fld id="{EE4BB34A-3E76-440A-BB03-4C2839922E1C}" type="datetimeFigureOut">
               <a:rPr lang="zh-TW" altLang="en-US" smtClean="0"/>
-              <a:t>2016/1/6</a:t>
+              <a:t>2016/1/5</a:t>
             </a:fld>
             <a:endParaRPr lang="zh-TW" altLang="en-US"/>
           </a:p>
@@ -2025,7 +2025,7 @@
           <a:p>
             <a:fld id="{EE4BB34A-3E76-440A-BB03-4C2839922E1C}" type="datetimeFigureOut">
               <a:rPr lang="zh-TW" altLang="en-US" smtClean="0"/>
-              <a:t>2016/1/6</a:t>
+              <a:t>2016/1/5</a:t>
             </a:fld>
             <a:endParaRPr lang="zh-TW" altLang="en-US"/>
           </a:p>
@@ -2180,7 +2180,7 @@
           <a:ln/>
           <a:extLst>
             <a:ext uri="{91240B29-F687-4f45-9708-019B960494DF}">
-              <a14:hiddenLine xmlns:a14="http://schemas.microsoft.com/office/drawing/2010/main" xmlns="" w="9525">
+              <a14:hiddenLine xmlns="" xmlns:a14="http://schemas.microsoft.com/office/drawing/2010/main" w="9525">
                 <a:solidFill>
                   <a:srgbClr val="000000"/>
                 </a:solidFill>
@@ -2298,7 +2298,7 @@
           <a:p>
             <a:fld id="{EE4BB34A-3E76-440A-BB03-4C2839922E1C}" type="datetimeFigureOut">
               <a:rPr lang="zh-TW" altLang="en-US" smtClean="0"/>
-              <a:t>2016/1/6</a:t>
+              <a:t>2016/1/5</a:t>
             </a:fld>
             <a:endParaRPr lang="zh-TW" altLang="en-US"/>
           </a:p>
@@ -2455,7 +2455,7 @@
           <a:ln/>
           <a:extLst>
             <a:ext uri="{91240B29-F687-4f45-9708-019B960494DF}">
-              <a14:hiddenLine xmlns:a14="http://schemas.microsoft.com/office/drawing/2010/main" xmlns="" w="9525">
+              <a14:hiddenLine xmlns="" xmlns:a14="http://schemas.microsoft.com/office/drawing/2010/main" w="9525">
                 <a:solidFill>
                   <a:srgbClr val="000000"/>
                 </a:solidFill>
@@ -2583,7 +2583,7 @@
           <a:p>
             <a:fld id="{EE4BB34A-3E76-440A-BB03-4C2839922E1C}" type="datetimeFigureOut">
               <a:rPr lang="zh-TW" altLang="en-US" smtClean="0"/>
-              <a:t>2016/1/6</a:t>
+              <a:t>2016/1/5</a:t>
             </a:fld>
             <a:endParaRPr lang="zh-TW" altLang="en-US"/>
           </a:p>
@@ -2738,7 +2738,7 @@
           <a:ln/>
           <a:extLst>
             <a:ext uri="{91240B29-F687-4f45-9708-019B960494DF}">
-              <a14:hiddenLine xmlns:a14="http://schemas.microsoft.com/office/drawing/2010/main" xmlns="" w="9525">
+              <a14:hiddenLine xmlns="" xmlns:a14="http://schemas.microsoft.com/office/drawing/2010/main" w="9525">
                 <a:solidFill>
                   <a:srgbClr val="000000"/>
                 </a:solidFill>
@@ -2866,7 +2866,7 @@
           <a:p>
             <a:fld id="{EE4BB34A-3E76-440A-BB03-4C2839922E1C}" type="datetimeFigureOut">
               <a:rPr lang="zh-TW" altLang="en-US" smtClean="0"/>
-              <a:t>2016/1/6</a:t>
+              <a:t>2016/1/5</a:t>
             </a:fld>
             <a:endParaRPr lang="zh-TW" altLang="en-US"/>
           </a:p>
@@ -3209,7 +3209,7 @@
           <a:p>
             <a:fld id="{EE4BB34A-3E76-440A-BB03-4C2839922E1C}" type="datetimeFigureOut">
               <a:rPr lang="zh-TW" altLang="en-US" smtClean="0"/>
-              <a:t>2016/1/6</a:t>
+              <a:t>2016/1/5</a:t>
             </a:fld>
             <a:endParaRPr lang="zh-TW" altLang="en-US"/>
           </a:p>
@@ -3364,7 +3364,7 @@
           <a:ln/>
           <a:extLst>
             <a:ext uri="{91240B29-F687-4f45-9708-019B960494DF}">
-              <a14:hiddenLine xmlns:a14="http://schemas.microsoft.com/office/drawing/2010/main" xmlns="" w="9525">
+              <a14:hiddenLine xmlns="" xmlns:a14="http://schemas.microsoft.com/office/drawing/2010/main" w="9525">
                 <a:solidFill>
                   <a:srgbClr val="000000"/>
                 </a:solidFill>
@@ -3548,7 +3548,7 @@
           <a:p>
             <a:fld id="{EE4BB34A-3E76-440A-BB03-4C2839922E1C}" type="datetimeFigureOut">
               <a:rPr lang="zh-TW" altLang="en-US" smtClean="0"/>
-              <a:t>2016/1/6</a:t>
+              <a:t>2016/1/5</a:t>
             </a:fld>
             <a:endParaRPr lang="zh-TW" altLang="en-US"/>
           </a:p>
@@ -3703,7 +3703,7 @@
           <a:ln/>
           <a:extLst>
             <a:ext uri="{91240B29-F687-4f45-9708-019B960494DF}">
-              <a14:hiddenLine xmlns:a14="http://schemas.microsoft.com/office/drawing/2010/main" xmlns="" w="9525">
+              <a14:hiddenLine xmlns="" xmlns:a14="http://schemas.microsoft.com/office/drawing/2010/main" w="9525">
                 <a:solidFill>
                   <a:srgbClr val="000000"/>
                 </a:solidFill>
@@ -4025,7 +4025,7 @@
           <a:p>
             <a:fld id="{EE4BB34A-3E76-440A-BB03-4C2839922E1C}" type="datetimeFigureOut">
               <a:rPr lang="zh-TW" altLang="en-US" smtClean="0"/>
-              <a:t>2016/1/6</a:t>
+              <a:t>2016/1/5</a:t>
             </a:fld>
             <a:endParaRPr lang="zh-TW" altLang="en-US"/>
           </a:p>
@@ -4180,7 +4180,7 @@
           <a:ln/>
           <a:extLst>
             <a:ext uri="{91240B29-F687-4f45-9708-019B960494DF}">
-              <a14:hiddenLine xmlns:a14="http://schemas.microsoft.com/office/drawing/2010/main" xmlns="" w="9525">
+              <a14:hiddenLine xmlns="" xmlns:a14="http://schemas.microsoft.com/office/drawing/2010/main" w="9525">
                 <a:solidFill>
                   <a:srgbClr val="000000"/>
                 </a:solidFill>
@@ -4246,7 +4246,7 @@
           <a:p>
             <a:fld id="{EE4BB34A-3E76-440A-BB03-4C2839922E1C}" type="datetimeFigureOut">
               <a:rPr lang="zh-TW" altLang="en-US" smtClean="0"/>
-              <a:t>2016/1/6</a:t>
+              <a:t>2016/1/5</a:t>
             </a:fld>
             <a:endParaRPr lang="zh-TW" altLang="en-US"/>
           </a:p>
@@ -4341,7 +4341,7 @@
           <a:p>
             <a:fld id="{EE4BB34A-3E76-440A-BB03-4C2839922E1C}" type="datetimeFigureOut">
               <a:rPr lang="zh-TW" altLang="en-US" smtClean="0"/>
-              <a:t>2016/1/6</a:t>
+              <a:t>2016/1/5</a:t>
             </a:fld>
             <a:endParaRPr lang="zh-TW" altLang="en-US"/>
           </a:p>
@@ -4609,7 +4609,7 @@
           <a:ln/>
           <a:extLst>
             <a:ext uri="{91240B29-F687-4f45-9708-019B960494DF}">
-              <a14:hiddenLine xmlns:a14="http://schemas.microsoft.com/office/drawing/2010/main" xmlns="" w="9525">
+              <a14:hiddenLine xmlns="" xmlns:a14="http://schemas.microsoft.com/office/drawing/2010/main" w="9525">
                 <a:solidFill>
                   <a:srgbClr val="000000"/>
                 </a:solidFill>
@@ -4808,7 +4808,7 @@
           <a:p>
             <a:fld id="{EE4BB34A-3E76-440A-BB03-4C2839922E1C}" type="datetimeFigureOut">
               <a:rPr lang="zh-TW" altLang="en-US" smtClean="0"/>
-              <a:t>2016/1/6</a:t>
+              <a:t>2016/1/5</a:t>
             </a:fld>
             <a:endParaRPr lang="zh-TW" altLang="en-US"/>
           </a:p>
@@ -5121,7 +5121,7 @@
           <a:p>
             <a:fld id="{EE4BB34A-3E76-440A-BB03-4C2839922E1C}" type="datetimeFigureOut">
               <a:rPr lang="zh-TW" altLang="en-US" smtClean="0"/>
-              <a:t>2016/1/6</a:t>
+              <a:t>2016/1/5</a:t>
             </a:fld>
             <a:endParaRPr lang="zh-TW" altLang="en-US"/>
           </a:p>
@@ -5391,7 +5391,7 @@
           <a:p>
             <a:fld id="{EE4BB34A-3E76-440A-BB03-4C2839922E1C}" type="datetimeFigureOut">
               <a:rPr lang="zh-TW" altLang="en-US" smtClean="0"/>
-              <a:t>2016/1/6</a:t>
+              <a:t>2016/1/5</a:t>
             </a:fld>
             <a:endParaRPr lang="zh-TW" altLang="en-US"/>
           </a:p>
@@ -11856,6 +11856,13 @@
           </a:bodyPr>
           <a:lstStyle/>
           <a:p>
+            <a:r>
+              <a:rPr lang="en-US" altLang="zh-TW" sz="4000" b="1" smtClean="0">
+                <a:latin typeface="微軟正黑體" panose="020B0604030504040204" pitchFamily="34" charset="-120"/>
+                <a:ea typeface="微軟正黑體" panose="020B0604030504040204" pitchFamily="34" charset="-120"/>
+              </a:rPr>
+              <a:t>0105</a:t>
+            </a:r>
             <a:r>
               <a:rPr lang="zh-TW" altLang="en-US" sz="4000" b="1" smtClean="0">
                 <a:latin typeface="微軟正黑體" panose="020B0604030504040204" pitchFamily="34" charset="-120"/>

</xml_diff>